<commit_message>
Added SNOUT vertical top angle
-Updated help documentation
</commit_message>
<xml_diff>
--- a/help/resource/falling_particle_geometry.pptx
+++ b/help/resource/falling_particle_geometry.pptx
@@ -234,7 +234,7 @@
           <a:p>
             <a:fld id="{CB2BFBF5-9F8A-40B1-88F4-AFAE0BF032A6}" type="datetimeFigureOut">
               <a:rPr lang="en-US" smtClean="0"/>
-              <a:t>4/24/2023</a:t>
+              <a:t>5/23/2023</a:t>
             </a:fld>
             <a:endParaRPr lang="en-US"/>
           </a:p>
@@ -411,7 +411,7 @@
           </a:lstStyle>
           <a:p>
             <a:fld id="{9D67FED6-1CE0-9E49-8E28-4BC1AFD39CD7}" type="datetimeFigureOut">
-              <a:t>4/24/2023</a:t>
+              <a:t>5/23/2023</a:t>
             </a:fld>
             <a:endParaRPr lang="en-US"/>
           </a:p>
@@ -38423,10 +38423,10 @@
       </p:sp>
       <p:grpSp>
         <p:nvGrpSpPr>
-          <p:cNvPr id="6" name="Group 5">
-            <a:extLst>
-              <a:ext uri="{FF2B5EF4-FFF2-40B4-BE49-F238E27FC236}">
-                <a16:creationId xmlns:a16="http://schemas.microsoft.com/office/drawing/2014/main" id="{60919BE3-137D-6D18-D1F9-BE0AE9A2A59B}"/>
+          <p:cNvPr id="95" name="Group 94">
+            <a:extLst>
+              <a:ext uri="{FF2B5EF4-FFF2-40B4-BE49-F238E27FC236}">
+                <a16:creationId xmlns:a16="http://schemas.microsoft.com/office/drawing/2014/main" id="{D7DA4176-41B6-3AE3-CF75-0395FD1097D5}"/>
               </a:ext>
             </a:extLst>
           </p:cNvPr>
@@ -38443,10 +38443,10 @@
         </p:grpSpPr>
         <p:grpSp>
           <p:nvGrpSpPr>
-            <p:cNvPr id="4" name="Group 3">
+            <p:cNvPr id="92" name="Group 91">
               <a:extLst>
                 <a:ext uri="{FF2B5EF4-FFF2-40B4-BE49-F238E27FC236}">
-                  <a16:creationId xmlns:a16="http://schemas.microsoft.com/office/drawing/2014/main" id="{9894D0C9-6056-454C-9952-3F07983D09AC}"/>
+                  <a16:creationId xmlns:a16="http://schemas.microsoft.com/office/drawing/2014/main" id="{B9272532-E509-0E7B-CBAF-A1D11DCAE84B}"/>
                 </a:ext>
               </a:extLst>
             </p:cNvPr>
@@ -38455,10 +38455,10 @@
           </p:nvGrpSpPr>
           <p:grpSpPr>
             <a:xfrm>
-              <a:off x="449944" y="1841256"/>
-              <a:ext cx="3266438" cy="3219700"/>
-              <a:chOff x="449944" y="1841256"/>
-              <a:chExt cx="3266438" cy="3219700"/>
+              <a:off x="449944" y="1821047"/>
+              <a:ext cx="3988614" cy="3239909"/>
+              <a:chOff x="449944" y="1821047"/>
+              <a:chExt cx="3988614" cy="3239909"/>
             </a:xfrm>
           </p:grpSpPr>
           <p:cxnSp>
@@ -38559,7 +38559,7 @@
             <p:spPr>
               <a:xfrm>
                 <a:off x="2038166" y="2169815"/>
-                <a:ext cx="1210291" cy="0"/>
+                <a:ext cx="1210291" cy="401935"/>
               </a:xfrm>
               <a:prstGeom prst="line">
                 <a:avLst/>
@@ -38644,7 +38644,7 @@
             </p:nvSpPr>
             <p:spPr>
               <a:xfrm>
-                <a:off x="2773367" y="1841256"/>
+                <a:off x="3495543" y="2530719"/>
                 <a:ext cx="943015" cy="307777"/>
               </a:xfrm>
               <a:prstGeom prst="rect">
@@ -38732,8 +38732,8 @@
             </p:nvSpPr>
             <p:spPr>
               <a:xfrm>
-                <a:off x="2038166" y="4378296"/>
-                <a:ext cx="735202" cy="430887"/>
+                <a:off x="1226047" y="4402187"/>
+                <a:ext cx="1617305" cy="261610"/>
               </a:xfrm>
               <a:prstGeom prst="rect">
                 <a:avLst/>
@@ -38749,7 +38749,7 @@
                 <a:pPr algn="ctr"/>
                 <a:r>
                   <a:rPr lang="en-US" sz="1100" dirty="0"/>
-                  <a:t>Angle of SNOUT</a:t>
+                  <a:t>Bottom Vertical Angle</a:t>
                 </a:r>
               </a:p>
             </p:txBody>
@@ -38769,9 +38769,9 @@
               <p:nvPr/>
             </p:nvCxnSpPr>
             <p:spPr>
-              <a:xfrm>
-                <a:off x="2843352" y="4636184"/>
-                <a:ext cx="365760" cy="0"/>
+              <a:xfrm flipV="1">
+                <a:off x="2459831" y="4636184"/>
+                <a:ext cx="749281" cy="0"/>
               </a:xfrm>
               <a:prstGeom prst="line">
                 <a:avLst/>
@@ -38952,8 +38952,8 @@
             </p:nvCxnSpPr>
             <p:spPr>
               <a:xfrm rot="5400000">
-                <a:off x="1683186" y="4636851"/>
-                <a:ext cx="731520" cy="0"/>
+                <a:off x="1911786" y="4839330"/>
+                <a:ext cx="274320" cy="0"/>
               </a:xfrm>
               <a:prstGeom prst="line">
                 <a:avLst/>
@@ -39065,17 +39065,18 @@
               </p:cNvPr>
               <p:cNvCxnSpPr>
                 <a:cxnSpLocks/>
-                <a:endCxn id="22" idx="1"/>
               </p:cNvCxnSpPr>
               <p:nvPr/>
             </p:nvCxnSpPr>
             <p:spPr>
-              <a:xfrm rot="5400000" flipH="1" flipV="1">
-                <a:off x="2638755" y="2023925"/>
-                <a:ext cx="163392" cy="105832"/>
+              <a:xfrm>
+                <a:off x="3244874" y="2571750"/>
+                <a:ext cx="267732" cy="112858"/>
               </a:xfrm>
-              <a:prstGeom prst="bentConnector2">
-                <a:avLst/>
+              <a:prstGeom prst="bentConnector3">
+                <a:avLst>
+                  <a:gd name="adj1" fmla="val 50000"/>
+                </a:avLst>
               </a:prstGeom>
               <a:ln w="9525">
                 <a:solidFill>
@@ -39362,13 +39363,215 @@
               </a:fontRef>
             </p:style>
           </p:cxnSp>
+          <p:sp>
+            <p:nvSpPr>
+              <p:cNvPr id="65" name="TextBox 64">
+                <a:extLst>
+                  <a:ext uri="{FF2B5EF4-FFF2-40B4-BE49-F238E27FC236}">
+                    <a16:creationId xmlns:a16="http://schemas.microsoft.com/office/drawing/2014/main" id="{5E1E79C6-767F-7B87-8AE8-B8522E74291E}"/>
+                  </a:ext>
+                </a:extLst>
+              </p:cNvPr>
+              <p:cNvSpPr txBox="1"/>
+              <p:nvPr/>
+            </p:nvSpPr>
+            <p:spPr>
+              <a:xfrm>
+                <a:off x="2377117" y="2127209"/>
+                <a:ext cx="1617305" cy="261610"/>
+              </a:xfrm>
+              <a:prstGeom prst="rect">
+                <a:avLst/>
+              </a:prstGeom>
+              <a:noFill/>
+            </p:spPr>
+            <p:txBody>
+              <a:bodyPr wrap="square" rtlCol="0">
+                <a:spAutoFit/>
+              </a:bodyPr>
+              <a:lstStyle/>
+              <a:p>
+                <a:pPr algn="ctr"/>
+                <a:r>
+                  <a:rPr lang="en-US" sz="1100" dirty="0"/>
+                  <a:t>Top Vertical Angle</a:t>
+                </a:r>
+              </a:p>
+            </p:txBody>
+          </p:sp>
+          <p:grpSp>
+            <p:nvGrpSpPr>
+              <p:cNvPr id="68" name="Group 67">
+                <a:extLst>
+                  <a:ext uri="{FF2B5EF4-FFF2-40B4-BE49-F238E27FC236}">
+                    <a16:creationId xmlns:a16="http://schemas.microsoft.com/office/drawing/2014/main" id="{2A9E0BEE-9B9C-DA5C-CEA7-E8E0DE175D51}"/>
+                  </a:ext>
+                </a:extLst>
+              </p:cNvPr>
+              <p:cNvGrpSpPr/>
+              <p:nvPr/>
+            </p:nvGrpSpPr>
+            <p:grpSpPr>
+              <a:xfrm flipH="1" flipV="1">
+                <a:off x="1813709" y="1821047"/>
+                <a:ext cx="1052775" cy="655959"/>
+                <a:chOff x="2915155" y="1839607"/>
+                <a:chExt cx="1052775" cy="655959"/>
+              </a:xfrm>
+            </p:grpSpPr>
+            <p:sp>
+              <p:nvSpPr>
+                <p:cNvPr id="31" name="Arc 30">
+                  <a:extLst>
+                    <a:ext uri="{FF2B5EF4-FFF2-40B4-BE49-F238E27FC236}">
+                      <a16:creationId xmlns:a16="http://schemas.microsoft.com/office/drawing/2014/main" id="{DB8F0ED7-A374-43D5-67A4-5287E26FA0E3}"/>
+                    </a:ext>
+                  </a:extLst>
+                </p:cNvPr>
+                <p:cNvSpPr/>
+                <p:nvPr/>
+              </p:nvSpPr>
+              <p:spPr>
+                <a:xfrm>
+                  <a:off x="3362082" y="1839607"/>
+                  <a:ext cx="605848" cy="655959"/>
+                </a:xfrm>
+                <a:prstGeom prst="arc">
+                  <a:avLst>
+                    <a:gd name="adj1" fmla="val 10925241"/>
+                    <a:gd name="adj2" fmla="val 12274328"/>
+                  </a:avLst>
+                </a:prstGeom>
+                <a:ln w="9525">
+                  <a:solidFill>
+                    <a:srgbClr val="000000"/>
+                  </a:solidFill>
+                </a:ln>
+                <a:effectLst/>
+              </p:spPr>
+              <p:style>
+                <a:lnRef idx="2">
+                  <a:schemeClr val="accent1"/>
+                </a:lnRef>
+                <a:fillRef idx="0">
+                  <a:schemeClr val="accent1"/>
+                </a:fillRef>
+                <a:effectRef idx="1">
+                  <a:schemeClr val="accent1"/>
+                </a:effectRef>
+                <a:fontRef idx="minor">
+                  <a:schemeClr val="tx1"/>
+                </a:fontRef>
+              </p:style>
+              <p:txBody>
+                <a:bodyPr rtlCol="0" anchor="ctr"/>
+                <a:lstStyle/>
+                <a:p>
+                  <a:pPr algn="ctr"/>
+                  <a:endParaRPr lang="en-US"/>
+                </a:p>
+              </p:txBody>
+            </p:sp>
+            <p:cxnSp>
+              <p:nvCxnSpPr>
+                <p:cNvPr id="66" name="Straight Connector 65">
+                  <a:extLst>
+                    <a:ext uri="{FF2B5EF4-FFF2-40B4-BE49-F238E27FC236}">
+                      <a16:creationId xmlns:a16="http://schemas.microsoft.com/office/drawing/2014/main" id="{AD8F3BA2-DDCC-4350-8975-5AA2A1E34B13}"/>
+                    </a:ext>
+                  </a:extLst>
+                </p:cNvPr>
+                <p:cNvCxnSpPr>
+                  <a:cxnSpLocks/>
+                </p:cNvCxnSpPr>
+                <p:nvPr/>
+              </p:nvCxnSpPr>
+              <p:spPr>
+                <a:xfrm flipV="1">
+                  <a:off x="2915155" y="2160898"/>
+                  <a:ext cx="749281" cy="0"/>
+                </a:xfrm>
+                <a:prstGeom prst="line">
+                  <a:avLst/>
+                </a:prstGeom>
+                <a:ln w="9525">
+                  <a:solidFill>
+                    <a:srgbClr val="000000"/>
+                  </a:solidFill>
+                </a:ln>
+                <a:effectLst/>
+              </p:spPr>
+              <p:style>
+                <a:lnRef idx="2">
+                  <a:schemeClr val="accent1"/>
+                </a:lnRef>
+                <a:fillRef idx="0">
+                  <a:schemeClr val="accent1"/>
+                </a:fillRef>
+                <a:effectRef idx="1">
+                  <a:schemeClr val="accent1"/>
+                </a:effectRef>
+                <a:fontRef idx="minor">
+                  <a:schemeClr val="tx1"/>
+                </a:fontRef>
+              </p:style>
+            </p:cxnSp>
+            <p:cxnSp>
+              <p:nvCxnSpPr>
+                <p:cNvPr id="67" name="Connector: Elbow 66">
+                  <a:extLst>
+                    <a:ext uri="{FF2B5EF4-FFF2-40B4-BE49-F238E27FC236}">
+                      <a16:creationId xmlns:a16="http://schemas.microsoft.com/office/drawing/2014/main" id="{202BA75F-E760-C6FC-B9CB-EEA022E62E1A}"/>
+                    </a:ext>
+                  </a:extLst>
+                </p:cNvPr>
+                <p:cNvCxnSpPr>
+                  <a:cxnSpLocks/>
+                </p:cNvCxnSpPr>
+                <p:nvPr/>
+              </p:nvCxnSpPr>
+              <p:spPr>
+                <a:xfrm rot="10800000">
+                  <a:off x="3184238" y="2064171"/>
+                  <a:ext cx="180979" cy="30957"/>
+                </a:xfrm>
+                <a:prstGeom prst="bentConnector3">
+                  <a:avLst>
+                    <a:gd name="adj1" fmla="val 50000"/>
+                  </a:avLst>
+                </a:prstGeom>
+                <a:ln w="9525">
+                  <a:solidFill>
+                    <a:srgbClr val="000000"/>
+                  </a:solidFill>
+                  <a:headEnd type="oval" w="sm" len="sm"/>
+                  <a:tailEnd w="sm" len="sm"/>
+                </a:ln>
+                <a:effectLst/>
+              </p:spPr>
+              <p:style>
+                <a:lnRef idx="2">
+                  <a:schemeClr val="accent1"/>
+                </a:lnRef>
+                <a:fillRef idx="0">
+                  <a:schemeClr val="accent1"/>
+                </a:fillRef>
+                <a:effectRef idx="1">
+                  <a:schemeClr val="accent1"/>
+                </a:effectRef>
+                <a:fontRef idx="minor">
+                  <a:schemeClr val="tx1"/>
+                </a:fontRef>
+              </p:style>
+            </p:cxnSp>
+          </p:grpSp>
         </p:grpSp>
         <p:grpSp>
           <p:nvGrpSpPr>
-            <p:cNvPr id="5" name="Group 4">
+            <p:cNvPr id="94" name="Group 93">
               <a:extLst>
                 <a:ext uri="{FF2B5EF4-FFF2-40B4-BE49-F238E27FC236}">
-                  <a16:creationId xmlns:a16="http://schemas.microsoft.com/office/drawing/2014/main" id="{F77B0D40-774E-E7C4-A99C-93294A8FED6B}"/>
+                  <a16:creationId xmlns:a16="http://schemas.microsoft.com/office/drawing/2014/main" id="{263B76E5-4ADE-1CF9-6BF9-2AD882F49A03}"/>
                 </a:ext>
               </a:extLst>
             </p:cNvPr>
@@ -39613,8 +39816,8 @@
             </p:nvSpPr>
             <p:spPr>
               <a:xfrm>
-                <a:off x="5563771" y="3574341"/>
-                <a:ext cx="1454150" cy="461665"/>
+                <a:off x="5806535" y="3596051"/>
+                <a:ext cx="944388" cy="461665"/>
               </a:xfrm>
               <a:prstGeom prst="rect">
                 <a:avLst/>
@@ -39632,7 +39835,7 @@
                 <a:pPr algn="ctr"/>
                 <a:r>
                   <a:rPr lang="en-US" sz="1200" dirty="0"/>
-                  <a:t>Horizontal Angle of SNOUT</a:t>
+                  <a:t>Horizontal Angle</a:t>
                 </a:r>
               </a:p>
             </p:txBody>
@@ -39945,6 +40148,89 @@
               </a:p>
             </p:txBody>
           </p:sp>
+          <p:sp>
+            <p:nvSpPr>
+              <p:cNvPr id="69" name="TextBox 68">
+                <a:extLst>
+                  <a:ext uri="{FF2B5EF4-FFF2-40B4-BE49-F238E27FC236}">
+                    <a16:creationId xmlns:a16="http://schemas.microsoft.com/office/drawing/2014/main" id="{3494C7E1-CCD6-3C2B-29C9-E783666B153F}"/>
+                  </a:ext>
+                </a:extLst>
+              </p:cNvPr>
+              <p:cNvSpPr txBox="1"/>
+              <p:nvPr/>
+            </p:nvSpPr>
+            <p:spPr>
+              <a:xfrm>
+                <a:off x="4352219" y="2833216"/>
+                <a:ext cx="943015" cy="307777"/>
+              </a:xfrm>
+              <a:prstGeom prst="rect">
+                <a:avLst/>
+              </a:prstGeom>
+              <a:noFill/>
+            </p:spPr>
+            <p:txBody>
+              <a:bodyPr wrap="square" rtlCol="0">
+                <a:spAutoFit/>
+              </a:bodyPr>
+              <a:lstStyle/>
+              <a:p>
+                <a:pPr algn="ctr"/>
+                <a:r>
+                  <a:rPr lang="en-US" sz="1400" dirty="0"/>
+                  <a:t>SNOUT</a:t>
+                </a:r>
+              </a:p>
+            </p:txBody>
+          </p:sp>
+          <p:cxnSp>
+            <p:nvCxnSpPr>
+              <p:cNvPr id="74" name="Connector: Elbow 73">
+                <a:extLst>
+                  <a:ext uri="{FF2B5EF4-FFF2-40B4-BE49-F238E27FC236}">
+                    <a16:creationId xmlns:a16="http://schemas.microsoft.com/office/drawing/2014/main" id="{2D390893-7330-151D-AD66-C94B80BFA49E}"/>
+                  </a:ext>
+                </a:extLst>
+              </p:cNvPr>
+              <p:cNvCxnSpPr>
+                <a:cxnSpLocks/>
+                <a:endCxn id="69" idx="2"/>
+              </p:cNvCxnSpPr>
+              <p:nvPr/>
+            </p:nvCxnSpPr>
+            <p:spPr>
+              <a:xfrm rot="10800000">
+                <a:off x="4823728" y="3140993"/>
+                <a:ext cx="247993" cy="246088"/>
+              </a:xfrm>
+              <a:prstGeom prst="bentConnector2">
+                <a:avLst/>
+              </a:prstGeom>
+              <a:ln w="9525">
+                <a:solidFill>
+                  <a:srgbClr val="000000"/>
+                </a:solidFill>
+                <a:headEnd type="triangle" w="sm" len="sm"/>
+                <a:tailEnd w="sm" len="sm"/>
+              </a:ln>
+              <a:effectLst/>
+            </p:spPr>
+            <p:style>
+              <a:lnRef idx="2">
+                <a:schemeClr val="accent1"/>
+              </a:lnRef>
+              <a:fillRef idx="0">
+                <a:schemeClr val="accent1"/>
+              </a:fillRef>
+              <a:effectRef idx="1">
+                <a:schemeClr val="accent1"/>
+              </a:effectRef>
+              <a:fontRef idx="minor">
+                <a:schemeClr val="tx1"/>
+              </a:fontRef>
+            </p:style>
+          </p:cxnSp>
         </p:grpSp>
       </p:grpSp>
     </p:spTree>

</xml_diff>